<commit_message>
Working on raga chapter, time for a breal. Lets finish the variable replacement work in pattern chapter meanwhile.
</commit_message>
<xml_diff>
--- a/ch07_ragaRecognition/figures/raga_recognition_figs.pptx
+++ b/ch07_ragaRecognition/figures/raga_recognition_figs.pptx
@@ -109,6 +109,22 @@
       </a:defRPr>
     </a:lvl9pPr>
   </p:defaultTextStyle>
+  <p:extLst>
+    <p:ext uri="{EFAFB233-063F-42B5-8137-9DF3F51BA10A}">
+      <p15:sldGuideLst xmlns:p15="http://schemas.microsoft.com/office/powerpoint/2012/main">
+        <p15:guide id="1" orient="horz" pos="218">
+          <p15:clr>
+            <a:srgbClr val="A4A3A4"/>
+          </p15:clr>
+        </p15:guide>
+        <p15:guide id="2">
+          <p15:clr>
+            <a:srgbClr val="A4A3A4"/>
+          </p15:clr>
+        </p15:guide>
+      </p15:sldGuideLst>
+    </p:ext>
+  </p:extLst>
 </p:presentation>
 </file>
 
@@ -293,7 +309,7 @@
           <a:p>
             <a:fld id="{5EEB1E14-0601-0D41-AA1F-A99A495C6E68}" type="datetimeFigureOut">
               <a:rPr lang="en-US" smtClean="0"/>
-              <a:t>5/31/16</a:t>
+              <a:t>8/30/16</a:t>
             </a:fld>
             <a:endParaRPr lang="en-US"/>
           </a:p>
@@ -463,7 +479,7 @@
           <a:p>
             <a:fld id="{5EEB1E14-0601-0D41-AA1F-A99A495C6E68}" type="datetimeFigureOut">
               <a:rPr lang="en-US" smtClean="0"/>
-              <a:t>5/31/16</a:t>
+              <a:t>8/30/16</a:t>
             </a:fld>
             <a:endParaRPr lang="en-US"/>
           </a:p>
@@ -643,7 +659,7 @@
           <a:p>
             <a:fld id="{5EEB1E14-0601-0D41-AA1F-A99A495C6E68}" type="datetimeFigureOut">
               <a:rPr lang="en-US" smtClean="0"/>
-              <a:t>5/31/16</a:t>
+              <a:t>8/30/16</a:t>
             </a:fld>
             <a:endParaRPr lang="en-US"/>
           </a:p>
@@ -813,7 +829,7 @@
           <a:p>
             <a:fld id="{5EEB1E14-0601-0D41-AA1F-A99A495C6E68}" type="datetimeFigureOut">
               <a:rPr lang="en-US" smtClean="0"/>
-              <a:t>5/31/16</a:t>
+              <a:t>8/30/16</a:t>
             </a:fld>
             <a:endParaRPr lang="en-US"/>
           </a:p>
@@ -1059,7 +1075,7 @@
           <a:p>
             <a:fld id="{5EEB1E14-0601-0D41-AA1F-A99A495C6E68}" type="datetimeFigureOut">
               <a:rPr lang="en-US" smtClean="0"/>
-              <a:t>5/31/16</a:t>
+              <a:t>8/30/16</a:t>
             </a:fld>
             <a:endParaRPr lang="en-US"/>
           </a:p>
@@ -1347,7 +1363,7 @@
           <a:p>
             <a:fld id="{5EEB1E14-0601-0D41-AA1F-A99A495C6E68}" type="datetimeFigureOut">
               <a:rPr lang="en-US" smtClean="0"/>
-              <a:t>5/31/16</a:t>
+              <a:t>8/30/16</a:t>
             </a:fld>
             <a:endParaRPr lang="en-US"/>
           </a:p>
@@ -1769,7 +1785,7 @@
           <a:p>
             <a:fld id="{5EEB1E14-0601-0D41-AA1F-A99A495C6E68}" type="datetimeFigureOut">
               <a:rPr lang="en-US" smtClean="0"/>
-              <a:t>5/31/16</a:t>
+              <a:t>8/30/16</a:t>
             </a:fld>
             <a:endParaRPr lang="en-US"/>
           </a:p>
@@ -1887,7 +1903,7 @@
           <a:p>
             <a:fld id="{5EEB1E14-0601-0D41-AA1F-A99A495C6E68}" type="datetimeFigureOut">
               <a:rPr lang="en-US" smtClean="0"/>
-              <a:t>5/31/16</a:t>
+              <a:t>8/30/16</a:t>
             </a:fld>
             <a:endParaRPr lang="en-US"/>
           </a:p>
@@ -1982,7 +1998,7 @@
           <a:p>
             <a:fld id="{5EEB1E14-0601-0D41-AA1F-A99A495C6E68}" type="datetimeFigureOut">
               <a:rPr lang="en-US" smtClean="0"/>
-              <a:t>5/31/16</a:t>
+              <a:t>8/30/16</a:t>
             </a:fld>
             <a:endParaRPr lang="en-US"/>
           </a:p>
@@ -2259,7 +2275,7 @@
           <a:p>
             <a:fld id="{5EEB1E14-0601-0D41-AA1F-A99A495C6E68}" type="datetimeFigureOut">
               <a:rPr lang="en-US" smtClean="0"/>
-              <a:t>5/31/16</a:t>
+              <a:t>8/30/16</a:t>
             </a:fld>
             <a:endParaRPr lang="en-US"/>
           </a:p>
@@ -2512,7 +2528,7 @@
           <a:p>
             <a:fld id="{5EEB1E14-0601-0D41-AA1F-A99A495C6E68}" type="datetimeFigureOut">
               <a:rPr lang="en-US" smtClean="0"/>
-              <a:t>5/31/16</a:t>
+              <a:t>8/30/16</a:t>
             </a:fld>
             <a:endParaRPr lang="en-US"/>
           </a:p>
@@ -2725,7 +2741,7 @@
           <a:p>
             <a:fld id="{5EEB1E14-0601-0D41-AA1F-A99A495C6E68}" type="datetimeFigureOut">
               <a:rPr lang="en-US" smtClean="0"/>
-              <a:t>5/31/16</a:t>
+              <a:t>8/30/16</a:t>
             </a:fld>
             <a:endParaRPr lang="en-US"/>
           </a:p>
@@ -4467,14 +4483,7 @@
                 <a:latin typeface="Times New Roman"/>
                 <a:cs typeface="Times New Roman"/>
               </a:rPr>
-              <a:t>TFIDF Feature </a:t>
-            </a:r>
-            <a:r>
-              <a:rPr lang="en-US" sz="1700" dirty="0" smtClean="0">
-                <a:latin typeface="Times New Roman"/>
-                <a:cs typeface="Times New Roman"/>
-              </a:rPr>
-              <a:t>Extraction</a:t>
+              <a:t>TFIDF Feature Extraction</a:t>
             </a:r>
             <a:endParaRPr lang="en-US" sz="1700" dirty="0">
               <a:latin typeface="Times New Roman"/>
@@ -5615,14 +5624,7 @@
                 <a:latin typeface="Times New Roman"/>
                 <a:cs typeface="Times New Roman"/>
               </a:rPr>
-              <a:t> </a:t>
-            </a:r>
-            <a:r>
-              <a:rPr lang="en-US" dirty="0" smtClean="0">
-                <a:latin typeface="Times New Roman"/>
-                <a:cs typeface="Times New Roman"/>
-              </a:rPr>
-              <a:t>labels</a:t>
+              <a:t> labels</a:t>
             </a:r>
             <a:endParaRPr lang="en-US" dirty="0">
               <a:latin typeface="Times New Roman"/>
@@ -5666,14 +5668,7 @@
                 <a:latin typeface="Times New Roman"/>
                 <a:cs typeface="Times New Roman"/>
               </a:rPr>
-              <a:t>r</a:t>
-            </a:r>
-            <a:r>
-              <a:rPr lang="en-US" dirty="0" err="1" smtClean="0">
-                <a:latin typeface="Times New Roman"/>
-                <a:cs typeface="Times New Roman"/>
-              </a:rPr>
-              <a:t>āga</a:t>
+              <a:t>rāga</a:t>
             </a:r>
             <a:r>
               <a:rPr lang="en-US" dirty="0" smtClean="0">
@@ -7118,8 +7113,8 @@
         </p:nvSpPr>
         <p:spPr>
           <a:xfrm>
-            <a:off x="3071555" y="2427669"/>
-            <a:ext cx="1673801" cy="3690744"/>
+            <a:off x="3071556" y="2427669"/>
+            <a:ext cx="907778" cy="3690744"/>
           </a:xfrm>
           <a:prstGeom prst="roundRect">
             <a:avLst/>
@@ -7147,25 +7142,25 @@
           </a:fontRef>
         </p:style>
         <p:txBody>
-          <a:bodyPr rtlCol="0" anchor="ctr"/>
+          <a:bodyPr vert="vert270" rtlCol="0" anchor="ctr"/>
           <a:lstStyle/>
           <a:p>
             <a:pPr algn="ctr"/>
             <a:r>
-              <a:rPr lang="en-US" dirty="0" smtClean="0">
+              <a:rPr lang="en-US" sz="2000" dirty="0" smtClean="0">
                 <a:solidFill>
                   <a:schemeClr val="tx1"/>
                 </a:solidFill>
                 <a:latin typeface="Times New Roman"/>
                 <a:cs typeface="Times New Roman"/>
               </a:rPr>
-              <a:t>Phrase-based Feature</a:t>
+              <a:t>Feature</a:t>
             </a:r>
           </a:p>
           <a:p>
             <a:pPr algn="ctr"/>
             <a:r>
-              <a:rPr lang="en-US" dirty="0" smtClean="0">
+              <a:rPr lang="en-US" sz="2000" dirty="0" smtClean="0">
                 <a:solidFill>
                   <a:schemeClr val="tx1"/>
                 </a:solidFill>
@@ -7174,7 +7169,7 @@
               </a:rPr>
               <a:t>Extraction</a:t>
             </a:r>
-            <a:endParaRPr lang="en-US" dirty="0">
+            <a:endParaRPr lang="en-US" sz="2000" dirty="0">
               <a:solidFill>
                 <a:schemeClr val="tx1"/>
               </a:solidFill>
@@ -7192,8 +7187,8 @@
         </p:nvSpPr>
         <p:spPr>
           <a:xfrm>
-            <a:off x="6148030" y="2356327"/>
-            <a:ext cx="1673801" cy="3762085"/>
+            <a:off x="5267500" y="2356327"/>
+            <a:ext cx="911324" cy="3762085"/>
           </a:xfrm>
           <a:prstGeom prst="roundRect">
             <a:avLst/>
@@ -7221,12 +7216,12 @@
           </a:fontRef>
         </p:style>
         <p:txBody>
-          <a:bodyPr rtlCol="0" anchor="ctr"/>
+          <a:bodyPr vert="vert270" rtlCol="0" anchor="ctr"/>
           <a:lstStyle/>
           <a:p>
             <a:pPr algn="ctr"/>
             <a:r>
-              <a:rPr lang="en-US" dirty="0" smtClean="0">
+              <a:rPr lang="en-US" sz="2000" dirty="0" smtClean="0">
                 <a:solidFill>
                   <a:schemeClr val="tx1"/>
                 </a:solidFill>
@@ -7235,7 +7230,7 @@
               </a:rPr>
               <a:t>Classification</a:t>
             </a:r>
-            <a:endParaRPr lang="en-US" dirty="0">
+            <a:endParaRPr lang="en-US" sz="2000" dirty="0">
               <a:solidFill>
                 <a:schemeClr val="tx1"/>
               </a:solidFill>
@@ -7298,8 +7293,8 @@
         </p:nvSpPr>
         <p:spPr>
           <a:xfrm rot="16200000">
-            <a:off x="-772160" y="3361796"/>
-            <a:ext cx="1930400" cy="369332"/>
+            <a:off x="-772160" y="3346407"/>
+            <a:ext cx="1930400" cy="400110"/>
           </a:xfrm>
           <a:prstGeom prst="rect">
             <a:avLst/>
@@ -7314,13 +7309,13 @@
           <a:p>
             <a:pPr algn="ctr"/>
             <a:r>
-              <a:rPr lang="en-US" dirty="0" smtClean="0">
+              <a:rPr lang="en-US" sz="2000" dirty="0" smtClean="0">
                 <a:latin typeface="Times New Roman"/>
                 <a:cs typeface="Times New Roman"/>
               </a:rPr>
               <a:t>Training set</a:t>
             </a:r>
-            <a:endParaRPr lang="en-US" dirty="0">
+            <a:endParaRPr lang="en-US" sz="2000" dirty="0">
               <a:latin typeface="Times New Roman"/>
               <a:cs typeface="Times New Roman"/>
             </a:endParaRPr>
@@ -7335,8 +7330,8 @@
         </p:nvSpPr>
         <p:spPr>
           <a:xfrm rot="16200000">
-            <a:off x="-781647" y="5097161"/>
-            <a:ext cx="1930400" cy="369332"/>
+            <a:off x="-781647" y="5081772"/>
+            <a:ext cx="1930400" cy="400110"/>
           </a:xfrm>
           <a:prstGeom prst="rect">
             <a:avLst/>
@@ -7351,13 +7346,13 @@
           <a:p>
             <a:pPr algn="ctr"/>
             <a:r>
-              <a:rPr lang="en-US" dirty="0" smtClean="0">
+              <a:rPr lang="en-US" sz="2000" dirty="0" smtClean="0">
                 <a:latin typeface="Times New Roman"/>
                 <a:cs typeface="Times New Roman"/>
               </a:rPr>
               <a:t>Testing set</a:t>
             </a:r>
-            <a:endParaRPr lang="en-US" dirty="0">
+            <a:endParaRPr lang="en-US" sz="2000" dirty="0">
               <a:latin typeface="Times New Roman"/>
               <a:cs typeface="Times New Roman"/>
             </a:endParaRPr>
@@ -7417,8 +7412,8 @@
         </p:nvSpPr>
         <p:spPr>
           <a:xfrm>
-            <a:off x="382330" y="1714118"/>
-            <a:ext cx="1930400" cy="369332"/>
+            <a:off x="382329" y="1714118"/>
+            <a:ext cx="2293137" cy="400110"/>
           </a:xfrm>
           <a:prstGeom prst="rect">
             <a:avLst/>
@@ -7433,13 +7428,13 @@
           <a:p>
             <a:pPr algn="ctr"/>
             <a:r>
-              <a:rPr lang="en-US" dirty="0" smtClean="0">
+              <a:rPr lang="en-US" sz="2000" dirty="0" smtClean="0">
                 <a:latin typeface="Times New Roman"/>
                 <a:cs typeface="Times New Roman"/>
               </a:rPr>
               <a:t>Audio recordings</a:t>
             </a:r>
-            <a:endParaRPr lang="en-US" dirty="0">
+            <a:endParaRPr lang="en-US" sz="2000" dirty="0">
               <a:latin typeface="Times New Roman"/>
               <a:cs typeface="Times New Roman"/>
             </a:endParaRPr>
@@ -7454,8 +7449,8 @@
         </p:nvSpPr>
         <p:spPr>
           <a:xfrm>
-            <a:off x="4446072" y="1575618"/>
-            <a:ext cx="1930400" cy="646331"/>
+            <a:off x="3656725" y="1560230"/>
+            <a:ext cx="1930400" cy="707886"/>
           </a:xfrm>
           <a:prstGeom prst="rect">
             <a:avLst/>
@@ -7470,7 +7465,7 @@
           <a:p>
             <a:pPr algn="ctr"/>
             <a:r>
-              <a:rPr lang="en-US" dirty="0" smtClean="0">
+              <a:rPr lang="en-US" sz="2000" dirty="0" smtClean="0">
                 <a:latin typeface="Times New Roman"/>
                 <a:cs typeface="Times New Roman"/>
               </a:rPr>
@@ -7480,41 +7475,34 @@
           <a:p>
             <a:pPr algn="ctr"/>
             <a:r>
-              <a:rPr lang="en-US" dirty="0" smtClean="0">
+              <a:rPr lang="en-US" sz="2000" dirty="0" smtClean="0">
                 <a:latin typeface="Times New Roman"/>
                 <a:cs typeface="Times New Roman"/>
               </a:rPr>
               <a:t> </a:t>
             </a:r>
             <a:r>
-              <a:rPr lang="en-US" dirty="0" err="1">
+              <a:rPr lang="en-US" sz="2000" dirty="0" err="1">
                 <a:latin typeface="Times New Roman"/>
                 <a:cs typeface="Times New Roman"/>
               </a:rPr>
               <a:t>R</a:t>
             </a:r>
             <a:r>
-              <a:rPr lang="en-US" dirty="0" err="1" smtClean="0">
+              <a:rPr lang="en-US" sz="2000" dirty="0" err="1" smtClean="0">
                 <a:latin typeface="Times New Roman"/>
                 <a:cs typeface="Times New Roman"/>
               </a:rPr>
               <a:t>āga</a:t>
             </a:r>
             <a:r>
-              <a:rPr lang="en-US" dirty="0" smtClean="0">
+              <a:rPr lang="en-US" sz="2000" dirty="0" smtClean="0">
                 <a:latin typeface="Times New Roman"/>
                 <a:cs typeface="Times New Roman"/>
               </a:rPr>
-              <a:t> </a:t>
-            </a:r>
-            <a:r>
-              <a:rPr lang="en-US" dirty="0" smtClean="0">
-                <a:latin typeface="Times New Roman"/>
-                <a:cs typeface="Times New Roman"/>
-              </a:rPr>
-              <a:t>labels</a:t>
-            </a:r>
-            <a:endParaRPr lang="en-US" dirty="0">
+              <a:t> labels</a:t>
+            </a:r>
+            <a:endParaRPr lang="en-US" sz="2000" dirty="0">
               <a:latin typeface="Times New Roman"/>
               <a:cs typeface="Times New Roman"/>
             </a:endParaRPr>
@@ -7529,8 +7517,8 @@
         </p:nvSpPr>
         <p:spPr>
           <a:xfrm>
-            <a:off x="7448916" y="1575618"/>
-            <a:ext cx="1930400" cy="646331"/>
+            <a:off x="5723162" y="1560230"/>
+            <a:ext cx="1930400" cy="707886"/>
           </a:xfrm>
           <a:prstGeom prst="rect">
             <a:avLst/>
@@ -7545,34 +7533,27 @@
           <a:p>
             <a:pPr algn="ctr"/>
             <a:r>
-              <a:rPr lang="en-US" dirty="0" smtClean="0">
+              <a:rPr lang="en-US" sz="2000" dirty="0" smtClean="0">
                 <a:latin typeface="Times New Roman"/>
                 <a:cs typeface="Times New Roman"/>
               </a:rPr>
               <a:t>Predicted </a:t>
             </a:r>
             <a:r>
-              <a:rPr lang="en-US" dirty="0" err="1" smtClean="0">
+              <a:rPr lang="en-US" sz="2000" dirty="0" err="1" smtClean="0">
                 <a:latin typeface="Times New Roman"/>
                 <a:cs typeface="Times New Roman"/>
               </a:rPr>
-              <a:t>r</a:t>
-            </a:r>
-            <a:r>
-              <a:rPr lang="en-US" dirty="0" err="1" smtClean="0">
-                <a:latin typeface="Times New Roman"/>
-                <a:cs typeface="Times New Roman"/>
-              </a:rPr>
-              <a:t>āga</a:t>
-            </a:r>
-            <a:r>
-              <a:rPr lang="en-US" dirty="0" smtClean="0">
+              <a:t>rāga</a:t>
+            </a:r>
+            <a:r>
+              <a:rPr lang="en-US" sz="2000" dirty="0" smtClean="0">
                 <a:latin typeface="Times New Roman"/>
                 <a:cs typeface="Times New Roman"/>
               </a:rPr>
               <a:t> labels</a:t>
             </a:r>
-            <a:endParaRPr lang="en-US" dirty="0">
+            <a:endParaRPr lang="en-US" sz="2000" dirty="0">
               <a:latin typeface="Times New Roman"/>
               <a:cs typeface="Times New Roman"/>
             </a:endParaRPr>
@@ -7835,7 +7816,7 @@
         </p:nvCxnSpPr>
         <p:spPr>
           <a:xfrm>
-            <a:off x="5020733" y="3584222"/>
+            <a:off x="4140202" y="3584222"/>
             <a:ext cx="912555" cy="0"/>
           </a:xfrm>
           <a:prstGeom prst="straightConnector1">
@@ -7877,7 +7858,7 @@
         </p:nvCxnSpPr>
         <p:spPr>
           <a:xfrm>
-            <a:off x="5020733" y="5449383"/>
+            <a:off x="4140202" y="5449383"/>
             <a:ext cx="912555" cy="0"/>
           </a:xfrm>
           <a:prstGeom prst="straightConnector1">
@@ -7919,7 +7900,7 @@
         </p:nvCxnSpPr>
         <p:spPr>
           <a:xfrm>
-            <a:off x="7967133" y="5451877"/>
+            <a:off x="6316268" y="5449383"/>
             <a:ext cx="725311" cy="0"/>
           </a:xfrm>
           <a:prstGeom prst="straightConnector1">
@@ -7962,7 +7943,7 @@
         <p:spPr>
           <a:xfrm>
             <a:off x="2312730" y="3151116"/>
-            <a:ext cx="705556" cy="369332"/>
+            <a:ext cx="705556" cy="400110"/>
           </a:xfrm>
           <a:prstGeom prst="rect">
             <a:avLst/>
@@ -7976,19 +7957,62 @@
           <a:lstStyle/>
           <a:p>
             <a:r>
-              <a:rPr lang="en-US" dirty="0" smtClean="0">
+              <a:rPr lang="en-US" sz="2000" dirty="0" smtClean="0">
                 <a:latin typeface="Times New Roman"/>
                 <a:cs typeface="Times New Roman"/>
               </a:rPr>
               <a:t>R</a:t>
             </a:r>
             <a:r>
-              <a:rPr lang="en-US" baseline="-25000" dirty="0" smtClean="0">
+              <a:rPr lang="en-US" sz="2000" baseline="-25000" dirty="0" smtClean="0">
                 <a:latin typeface="Times New Roman"/>
                 <a:cs typeface="Times New Roman"/>
               </a:rPr>
               <a:t>tr</a:t>
             </a:r>
+            <a:endParaRPr lang="en-US" sz="2000" baseline="-25000" dirty="0">
+              <a:latin typeface="Times New Roman"/>
+              <a:cs typeface="Times New Roman"/>
+            </a:endParaRPr>
+          </a:p>
+        </p:txBody>
+      </p:sp>
+      <p:sp>
+        <p:nvSpPr>
+          <p:cNvPr id="63" name="TextBox 62"/>
+          <p:cNvSpPr txBox="1"/>
+          <p:nvPr/>
+        </p:nvSpPr>
+        <p:spPr>
+          <a:xfrm>
+            <a:off x="2312730" y="5023043"/>
+            <a:ext cx="705556" cy="400110"/>
+          </a:xfrm>
+          <a:prstGeom prst="rect">
+            <a:avLst/>
+          </a:prstGeom>
+          <a:noFill/>
+        </p:spPr>
+        <p:txBody>
+          <a:bodyPr wrap="square" rtlCol="0">
+            <a:spAutoFit/>
+          </a:bodyPr>
+          <a:lstStyle/>
+          <a:p>
+            <a:r>
+              <a:rPr lang="en-US" sz="2000" dirty="0" smtClean="0">
+                <a:latin typeface="Times New Roman"/>
+                <a:cs typeface="Times New Roman"/>
+              </a:rPr>
+              <a:t>R</a:t>
+            </a:r>
+            <a:r>
+              <a:rPr lang="en-US" sz="2000" baseline="-25000" dirty="0" smtClean="0">
+                <a:latin typeface="Times New Roman"/>
+                <a:cs typeface="Times New Roman"/>
+              </a:rPr>
+              <a:t>ts</a:t>
+            </a:r>
             <a:endParaRPr lang="en-US" baseline="-25000" dirty="0">
               <a:latin typeface="Times New Roman"/>
               <a:cs typeface="Times New Roman"/>
@@ -7998,14 +8022,14 @@
       </p:sp>
       <p:sp>
         <p:nvSpPr>
-          <p:cNvPr id="63" name="TextBox 62"/>
+          <p:cNvPr id="64" name="TextBox 63"/>
           <p:cNvSpPr txBox="1"/>
           <p:nvPr/>
         </p:nvSpPr>
         <p:spPr>
           <a:xfrm>
-            <a:off x="2312730" y="5023043"/>
-            <a:ext cx="705556" cy="369332"/>
+            <a:off x="4045420" y="3151116"/>
+            <a:ext cx="912555" cy="400110"/>
           </a:xfrm>
           <a:prstGeom prst="rect">
             <a:avLst/>
@@ -8019,20 +8043,64 @@
           <a:lstStyle/>
           <a:p>
             <a:r>
-              <a:rPr lang="en-US" dirty="0" smtClean="0">
+              <a:rPr lang="en-US" sz="2000" dirty="0" smtClean="0">
                 <a:latin typeface="Times New Roman"/>
                 <a:cs typeface="Times New Roman"/>
               </a:rPr>
-              <a:t>R</a:t>
-            </a:r>
-            <a:r>
-              <a:rPr lang="en-US" baseline="-25000" dirty="0" smtClean="0">
+              <a:t>(F, L)</a:t>
+            </a:r>
+            <a:r>
+              <a:rPr lang="en-US" sz="2000" baseline="-25000" dirty="0" err="1" smtClean="0">
+                <a:latin typeface="Times New Roman"/>
+                <a:cs typeface="Times New Roman"/>
+              </a:rPr>
+              <a:t>tr</a:t>
+            </a:r>
+            <a:endParaRPr lang="en-US" sz="2000" baseline="-25000" dirty="0">
+              <a:latin typeface="Times New Roman"/>
+              <a:cs typeface="Times New Roman"/>
+            </a:endParaRPr>
+          </a:p>
+        </p:txBody>
+      </p:sp>
+      <p:sp>
+        <p:nvSpPr>
+          <p:cNvPr id="65" name="TextBox 64"/>
+          <p:cNvSpPr txBox="1"/>
+          <p:nvPr/>
+        </p:nvSpPr>
+        <p:spPr>
+          <a:xfrm>
+            <a:off x="4035942" y="5023043"/>
+            <a:ext cx="912555" cy="400110"/>
+          </a:xfrm>
+          <a:prstGeom prst="rect">
+            <a:avLst/>
+          </a:prstGeom>
+          <a:noFill/>
+        </p:spPr>
+        <p:txBody>
+          <a:bodyPr wrap="square" rtlCol="0">
+            <a:spAutoFit/>
+          </a:bodyPr>
+          <a:lstStyle/>
+          <a:p>
+            <a:pPr algn="ctr"/>
+            <a:r>
+              <a:rPr lang="en-US" sz="2000" dirty="0" smtClean="0">
+                <a:latin typeface="Times New Roman"/>
+                <a:cs typeface="Times New Roman"/>
+              </a:rPr>
+              <a:t>F</a:t>
+            </a:r>
+            <a:r>
+              <a:rPr lang="en-US" sz="2000" baseline="-25000" dirty="0" smtClean="0">
                 <a:latin typeface="Times New Roman"/>
                 <a:cs typeface="Times New Roman"/>
               </a:rPr>
               <a:t>ts</a:t>
             </a:r>
-            <a:endParaRPr lang="en-US" baseline="-25000" dirty="0">
+            <a:endParaRPr lang="en-US" sz="2000" baseline="-25000" dirty="0">
               <a:latin typeface="Times New Roman"/>
               <a:cs typeface="Times New Roman"/>
             </a:endParaRPr>
@@ -8041,14 +8109,14 @@
       </p:sp>
       <p:sp>
         <p:nvSpPr>
-          <p:cNvPr id="64" name="TextBox 63"/>
+          <p:cNvPr id="66" name="TextBox 65"/>
           <p:cNvSpPr txBox="1"/>
           <p:nvPr/>
         </p:nvSpPr>
         <p:spPr>
           <a:xfrm>
-            <a:off x="4925951" y="3151116"/>
-            <a:ext cx="912555" cy="369332"/>
+            <a:off x="6129024" y="5005168"/>
+            <a:ext cx="912555" cy="400110"/>
           </a:xfrm>
           <a:prstGeom prst="rect">
             <a:avLst/>
@@ -8061,109 +8129,22 @@
           </a:bodyPr>
           <a:lstStyle/>
           <a:p>
-            <a:r>
-              <a:rPr lang="en-US" dirty="0" smtClean="0">
+            <a:pPr algn="ctr"/>
+            <a:r>
+              <a:rPr lang="en-US" sz="2000" dirty="0" err="1">
                 <a:latin typeface="Times New Roman"/>
                 <a:cs typeface="Times New Roman"/>
               </a:rPr>
-              <a:t>(F, L)</a:t>
-            </a:r>
-            <a:r>
-              <a:rPr lang="en-US" baseline="-25000" dirty="0" err="1" smtClean="0">
-                <a:latin typeface="Times New Roman"/>
-                <a:cs typeface="Times New Roman"/>
-              </a:rPr>
-              <a:t>tr</a:t>
-            </a:r>
-            <a:endParaRPr lang="en-US" baseline="-25000" dirty="0">
-              <a:latin typeface="Times New Roman"/>
-              <a:cs typeface="Times New Roman"/>
-            </a:endParaRPr>
-          </a:p>
-        </p:txBody>
-      </p:sp>
-      <p:sp>
-        <p:nvSpPr>
-          <p:cNvPr id="65" name="TextBox 64"/>
-          <p:cNvSpPr txBox="1"/>
-          <p:nvPr/>
-        </p:nvSpPr>
-        <p:spPr>
-          <a:xfrm>
-            <a:off x="4916473" y="5023043"/>
-            <a:ext cx="912555" cy="369332"/>
-          </a:xfrm>
-          <a:prstGeom prst="rect">
-            <a:avLst/>
-          </a:prstGeom>
-          <a:noFill/>
-        </p:spPr>
-        <p:txBody>
-          <a:bodyPr wrap="square" rtlCol="0">
-            <a:spAutoFit/>
-          </a:bodyPr>
-          <a:lstStyle/>
-          <a:p>
-            <a:pPr algn="ctr"/>
-            <a:r>
-              <a:rPr lang="en-US" dirty="0" smtClean="0">
-                <a:latin typeface="Times New Roman"/>
-                <a:cs typeface="Times New Roman"/>
-              </a:rPr>
-              <a:t>F</a:t>
-            </a:r>
-            <a:r>
-              <a:rPr lang="en-US" baseline="-25000" dirty="0" smtClean="0">
+              <a:t>L</a:t>
+            </a:r>
+            <a:r>
+              <a:rPr lang="en-US" sz="2000" baseline="-25000" dirty="0" err="1" smtClean="0">
                 <a:latin typeface="Times New Roman"/>
                 <a:cs typeface="Times New Roman"/>
               </a:rPr>
               <a:t>ts</a:t>
             </a:r>
-            <a:endParaRPr lang="en-US" baseline="-25000" dirty="0">
-              <a:latin typeface="Times New Roman"/>
-              <a:cs typeface="Times New Roman"/>
-            </a:endParaRPr>
-          </a:p>
-        </p:txBody>
-      </p:sp>
-      <p:sp>
-        <p:nvSpPr>
-          <p:cNvPr id="66" name="TextBox 65"/>
-          <p:cNvSpPr txBox="1"/>
-          <p:nvPr/>
-        </p:nvSpPr>
-        <p:spPr>
-          <a:xfrm>
-            <a:off x="7713264" y="5023043"/>
-            <a:ext cx="912555" cy="369332"/>
-          </a:xfrm>
-          <a:prstGeom prst="rect">
-            <a:avLst/>
-          </a:prstGeom>
-          <a:noFill/>
-        </p:spPr>
-        <p:txBody>
-          <a:bodyPr wrap="square" rtlCol="0">
-            <a:spAutoFit/>
-          </a:bodyPr>
-          <a:lstStyle/>
-          <a:p>
-            <a:pPr algn="ctr"/>
-            <a:r>
-              <a:rPr lang="en-US" dirty="0" err="1">
-                <a:latin typeface="Times New Roman"/>
-                <a:cs typeface="Times New Roman"/>
-              </a:rPr>
-              <a:t>L</a:t>
-            </a:r>
-            <a:r>
-              <a:rPr lang="en-US" baseline="-25000" dirty="0" err="1" smtClean="0">
-                <a:latin typeface="Times New Roman"/>
-                <a:cs typeface="Times New Roman"/>
-              </a:rPr>
-              <a:t>ts</a:t>
-            </a:r>
-            <a:endParaRPr lang="en-US" baseline="-25000" dirty="0">
+            <a:endParaRPr lang="en-US" sz="2000" baseline="-25000" dirty="0">
               <a:latin typeface="Times New Roman"/>
               <a:cs typeface="Times New Roman"/>
             </a:endParaRPr>

</xml_diff>